<commit_message>
Presentation Part 1: Added citations, removed footer in Part_1+2.pptx
</commit_message>
<xml_diff>
--- a/final project/Part_1+2.pptx
+++ b/final project/Part_1+2.pptx
@@ -390,7 +390,7 @@
               <a:pPr>
                 <a:defRPr/>
               </a:pPr>
-              <a:t>‹#›</a:t>
+              <a:t>‹Nr.›</a:t>
             </a:fld>
             <a:endParaRPr lang="en-GB"/>
           </a:p>
@@ -708,7 +708,7 @@
               <a:pPr>
                 <a:defRPr/>
               </a:pPr>
-              <a:t>‹#›</a:t>
+              <a:t>‹Nr.›</a:t>
             </a:fld>
             <a:endParaRPr lang="en-GB"/>
           </a:p>
@@ -1104,7 +1104,7 @@
             <a:fld id="{CE58CB1E-F828-4F11-99E0-327109AF9DA4}" type="slidenum">
               <a:rPr lang="de-DE" smtClean="0"/>
               <a:pPr/>
-              <a:t>‹#›</a:t>
+              <a:t>‹Nr.›</a:t>
             </a:fld>
             <a:endParaRPr lang="de-DE" dirty="0"/>
           </a:p>
@@ -1265,7 +1265,7 @@
             <a:fld id="{CE58CB1E-F828-4F11-99E0-327109AF9DA4}" type="slidenum">
               <a:rPr lang="de-DE" smtClean="0"/>
               <a:pPr/>
-              <a:t>‹#›</a:t>
+              <a:t>‹Nr.›</a:t>
             </a:fld>
             <a:endParaRPr lang="de-DE" dirty="0"/>
           </a:p>
@@ -1484,7 +1484,7 @@
             <a:fld id="{CE58CB1E-F828-4F11-99E0-327109AF9DA4}" type="slidenum">
               <a:rPr lang="de-DE" smtClean="0"/>
               <a:pPr/>
-              <a:t>‹#›</a:t>
+              <a:t>‹Nr.›</a:t>
             </a:fld>
             <a:endParaRPr lang="de-DE" dirty="0"/>
           </a:p>
@@ -1829,7 +1829,7 @@
             <a:fld id="{CE58CB1E-F828-4F11-99E0-327109AF9DA4}" type="slidenum">
               <a:rPr lang="de-DE" smtClean="0"/>
               <a:pPr/>
-              <a:t>‹#›</a:t>
+              <a:t>‹Nr.›</a:t>
             </a:fld>
             <a:endParaRPr lang="de-DE" dirty="0"/>
           </a:p>
@@ -2028,7 +2028,7 @@
             <a:fld id="{CE58CB1E-F828-4F11-99E0-327109AF9DA4}" type="slidenum">
               <a:rPr lang="de-DE" smtClean="0"/>
               <a:pPr/>
-              <a:t>‹#›</a:t>
+              <a:t>‹Nr.›</a:t>
             </a:fld>
             <a:endParaRPr lang="de-DE" dirty="0"/>
           </a:p>
@@ -2227,7 +2227,7 @@
             <a:fld id="{CE58CB1E-F828-4F11-99E0-327109AF9DA4}" type="slidenum">
               <a:rPr lang="de-DE" smtClean="0"/>
               <a:pPr/>
-              <a:t>‹#›</a:t>
+              <a:t>‹Nr.›</a:t>
             </a:fld>
             <a:endParaRPr lang="de-DE" dirty="0"/>
           </a:p>
@@ -2548,7 +2548,7 @@
             <a:fld id="{CE58CB1E-F828-4F11-99E0-327109AF9DA4}" type="slidenum">
               <a:rPr lang="de-DE" smtClean="0"/>
               <a:pPr/>
-              <a:t>‹#›</a:t>
+              <a:t>‹Nr.›</a:t>
             </a:fld>
             <a:endParaRPr lang="de-DE" dirty="0"/>
           </a:p>
@@ -2724,7 +2724,7 @@
             <a:fld id="{CE58CB1E-F828-4F11-99E0-327109AF9DA4}" type="slidenum">
               <a:rPr lang="de-DE" smtClean="0"/>
               <a:pPr/>
-              <a:t>‹#›</a:t>
+              <a:t>‹Nr.›</a:t>
             </a:fld>
             <a:endParaRPr lang="de-DE" dirty="0"/>
           </a:p>
@@ -3039,7 +3039,7 @@
             <a:fld id="{CE58CB1E-F828-4F11-99E0-327109AF9DA4}" type="slidenum">
               <a:rPr lang="de-DE" smtClean="0"/>
               <a:pPr/>
-              <a:t>‹#›</a:t>
+              <a:t>‹Nr.›</a:t>
             </a:fld>
             <a:endParaRPr lang="de-DE" dirty="0"/>
           </a:p>
@@ -3311,7 +3311,7 @@
             <a:fld id="{CE58CB1E-F828-4F11-99E0-327109AF9DA4}" type="slidenum">
               <a:rPr lang="de-DE" smtClean="0"/>
               <a:pPr/>
-              <a:t>‹#›</a:t>
+              <a:t>‹Nr.›</a:t>
             </a:fld>
             <a:endParaRPr lang="de-DE" dirty="0"/>
           </a:p>
@@ -3498,7 +3498,7 @@
             <a:fld id="{CE58CB1E-F828-4F11-99E0-327109AF9DA4}" type="slidenum">
               <a:rPr lang="de-DE" smtClean="0"/>
               <a:pPr/>
-              <a:t>‹#›</a:t>
+              <a:t>‹Nr.›</a:t>
             </a:fld>
             <a:endParaRPr lang="de-DE" dirty="0"/>
           </a:p>
@@ -3697,7 +3697,7 @@
             <a:fld id="{CE58CB1E-F828-4F11-99E0-327109AF9DA4}" type="slidenum">
               <a:rPr lang="de-DE" smtClean="0"/>
               <a:pPr/>
-              <a:t>‹#›</a:t>
+              <a:t>‹Nr.›</a:t>
             </a:fld>
             <a:endParaRPr lang="de-DE" dirty="0"/>
           </a:p>
@@ -3896,7 +3896,7 @@
             <a:fld id="{CE58CB1E-F828-4F11-99E0-327109AF9DA4}" type="slidenum">
               <a:rPr lang="de-DE" smtClean="0"/>
               <a:pPr/>
-              <a:t>‹#›</a:t>
+              <a:t>‹Nr.›</a:t>
             </a:fld>
             <a:endParaRPr lang="de-DE" dirty="0"/>
           </a:p>
@@ -3981,7 +3981,7 @@
             <a:fld id="{CE58CB1E-F828-4F11-99E0-327109AF9DA4}" type="slidenum">
               <a:rPr lang="de-DE" smtClean="0"/>
               <a:pPr/>
-              <a:t>‹#›</a:t>
+              <a:t>‹Nr.›</a:t>
             </a:fld>
             <a:endParaRPr lang="de-DE" dirty="0"/>
           </a:p>
@@ -4262,7 +4262,7 @@
             <a:fld id="{CE58CB1E-F828-4F11-99E0-327109AF9DA4}" type="slidenum">
               <a:rPr lang="de-DE" smtClean="0"/>
               <a:pPr/>
-              <a:t>‹#›</a:t>
+              <a:t>‹Nr.›</a:t>
             </a:fld>
             <a:endParaRPr lang="de-DE" dirty="0"/>
           </a:p>
@@ -4473,7 +4473,7 @@
             <a:fld id="{CE58CB1E-F828-4F11-99E0-327109AF9DA4}" type="slidenum">
               <a:rPr lang="de-DE" smtClean="0"/>
               <a:pPr/>
-              <a:t>‹#›</a:t>
+              <a:t>‹Nr.›</a:t>
             </a:fld>
             <a:endParaRPr lang="de-DE" dirty="0"/>
           </a:p>
@@ -4672,7 +4672,7 @@
             <a:fld id="{CE58CB1E-F828-4F11-99E0-327109AF9DA4}" type="slidenum">
               <a:rPr lang="de-DE" smtClean="0"/>
               <a:pPr/>
-              <a:t>‹#›</a:t>
+              <a:t>‹Nr.›</a:t>
             </a:fld>
             <a:endParaRPr lang="de-DE" dirty="0"/>
           </a:p>
@@ -4848,7 +4848,7 @@
             <a:fld id="{CE58CB1E-F828-4F11-99E0-327109AF9DA4}" type="slidenum">
               <a:rPr lang="de-DE" smtClean="0"/>
               <a:pPr/>
-              <a:t>‹#›</a:t>
+              <a:t>‹Nr.›</a:t>
             </a:fld>
             <a:endParaRPr lang="de-DE" dirty="0"/>
           </a:p>
@@ -5217,7 +5217,7 @@
             <a:fld id="{CE58CB1E-F828-4F11-99E0-327109AF9DA4}" type="slidenum">
               <a:rPr lang="de-DE" smtClean="0"/>
               <a:pPr/>
-              <a:t>‹#›</a:t>
+              <a:t>‹Nr.›</a:t>
             </a:fld>
             <a:endParaRPr lang="de-DE" dirty="0"/>
           </a:p>
@@ -5416,7 +5416,7 @@
             <a:fld id="{CE58CB1E-F828-4F11-99E0-327109AF9DA4}" type="slidenum">
               <a:rPr lang="de-DE" smtClean="0"/>
               <a:pPr/>
-              <a:t>‹#›</a:t>
+              <a:t>‹Nr.›</a:t>
             </a:fld>
             <a:endParaRPr lang="de-DE" dirty="0"/>
           </a:p>
@@ -5640,7 +5640,7 @@
             <a:fld id="{CE58CB1E-F828-4F11-99E0-327109AF9DA4}" type="slidenum">
               <a:rPr lang="de-DE" smtClean="0"/>
               <a:pPr/>
-              <a:t>‹#›</a:t>
+              <a:t>‹Nr.›</a:t>
             </a:fld>
             <a:endParaRPr lang="de-DE" dirty="0"/>
           </a:p>
@@ -5877,7 +5877,7 @@
             <a:fld id="{CE58CB1E-F828-4F11-99E0-327109AF9DA4}" type="slidenum">
               <a:rPr lang="de-DE" smtClean="0"/>
               <a:pPr/>
-              <a:t>‹#›</a:t>
+              <a:t>‹Nr.›</a:t>
             </a:fld>
             <a:endParaRPr lang="de-DE" dirty="0"/>
           </a:p>
@@ -6355,7 +6355,7 @@
                   <a:spcPct val="114000"/>
                 </a:lnSpc>
               </a:pPr>
-              <a:t>‹#›</a:t>
+              <a:t>‹Nr.›</a:t>
             </a:fld>
             <a:endParaRPr lang="de-DE" sz="1200" dirty="0">
               <a:latin typeface="+mn-lt"/>
@@ -6447,7 +6447,7 @@
             <a:fld id="{CE58CB1E-F828-4F11-99E0-327109AF9DA4}" type="slidenum">
               <a:rPr lang="de-DE" noProof="0" smtClean="0"/>
               <a:pPr/>
-              <a:t>‹#›</a:t>
+              <a:t>‹Nr.›</a:t>
             </a:fld>
             <a:endParaRPr lang="de-DE" noProof="0"/>
           </a:p>
@@ -6961,7 +6961,7 @@
             <a:fld id="{CE58CB1E-F828-4F11-99E0-327109AF9DA4}" type="slidenum">
               <a:rPr lang="de-DE" smtClean="0"/>
               <a:pPr/>
-              <a:t>‹#›</a:t>
+              <a:t>‹Nr.›</a:t>
             </a:fld>
             <a:endParaRPr lang="de-DE" dirty="0"/>
           </a:p>
@@ -7637,7 +7637,7 @@
             <a:fld id="{CE58CB1E-F828-4F11-99E0-327109AF9DA4}" type="slidenum">
               <a:rPr lang="de-DE" smtClean="0"/>
               <a:pPr/>
-              <a:t>‹#›</a:t>
+              <a:t>‹Nr.›</a:t>
             </a:fld>
             <a:endParaRPr lang="de-DE" dirty="0"/>
           </a:p>
@@ -8234,7 +8234,7 @@
             <a:fld id="{CE58CB1E-F828-4F11-99E0-327109AF9DA4}" type="slidenum">
               <a:rPr lang="de-DE" smtClean="0"/>
               <a:pPr/>
-              <a:t>‹#›</a:t>
+              <a:t>‹Nr.›</a:t>
             </a:fld>
             <a:endParaRPr lang="de-DE" dirty="0"/>
           </a:p>
@@ -8831,7 +8831,7 @@
             <a:fld id="{CE58CB1E-F828-4F11-99E0-327109AF9DA4}" type="slidenum">
               <a:rPr lang="de-DE" smtClean="0"/>
               <a:pPr/>
-              <a:t>‹#›</a:t>
+              <a:t>‹Nr.›</a:t>
             </a:fld>
             <a:endParaRPr lang="de-DE" dirty="0"/>
           </a:p>
@@ -9332,19 +9332,19 @@
             </a:r>
             <a:r>
               <a:rPr lang="en-US" altLang="zh-CN" dirty="0"/>
-              <a:t> Gao (03779844)</a:t>
+              <a:t> Gao</a:t>
             </a:r>
           </a:p>
           <a:p>
             <a:r>
               <a:rPr lang="en-US" altLang="zh-CN" dirty="0"/>
-              <a:t>Jingyi Zhang (03785924)</a:t>
+              <a:t>Jingyi Zhang</a:t>
             </a:r>
           </a:p>
           <a:p>
             <a:r>
               <a:rPr lang="en-US" altLang="zh-CN" dirty="0"/>
-              <a:t>Maximilian Mayr (03738789)</a:t>
+              <a:t>Maximilian Mayr</a:t>
             </a:r>
           </a:p>
           <a:p>
@@ -9354,7 +9354,7 @@
             </a:r>
             <a:r>
               <a:rPr lang="en-US" altLang="zh-CN" dirty="0"/>
-              <a:t> Liu (03779947)</a:t>
+              <a:t> Liu</a:t>
             </a:r>
           </a:p>
           <a:p>
@@ -9366,10 +9366,7 @@
               <a:rPr lang="en-US" altLang="zh-CN" dirty="0" err="1"/>
               <a:t>Laverde</a:t>
             </a:r>
-            <a:r>
-              <a:rPr lang="en-US" altLang="zh-CN" dirty="0"/>
-              <a:t> (03766289)</a:t>
-            </a:r>
+            <a:endParaRPr lang="en-US" altLang="zh-CN" dirty="0"/>
           </a:p>
           <a:p>
             <a:r>
@@ -10543,29 +10540,6 @@
       </p:sp>
       <p:sp>
         <p:nvSpPr>
-          <p:cNvPr id="7" name="Fußzeilenplatzhalter 4"/>
-          <p:cNvSpPr>
-            <a:spLocks noGrp="1"/>
-          </p:cNvSpPr>
-          <p:nvPr>
-            <p:ph type="ftr" sz="quarter" idx="12"/>
-          </p:nvPr>
-        </p:nvSpPr>
-        <p:spPr/>
-        <p:txBody>
-          <a:bodyPr/>
-          <a:lstStyle/>
-          <a:p>
-            <a:r>
-              <a:rPr lang="de-DE"/>
-              <a:t>Dr. rer. nat. Erika Mustermann (TUM) | kann beliebig erweitert werden | Infos mit Strich trennen</a:t>
-            </a:r>
-            <a:endParaRPr lang="en-US" dirty="0"/>
-          </a:p>
-        </p:txBody>
-      </p:sp>
-      <p:sp>
-        <p:nvSpPr>
           <p:cNvPr id="3" name="Titel 2"/>
           <p:cNvSpPr>
             <a:spLocks noGrp="1"/>
@@ -10637,6 +10611,83 @@
           </a:prstGeom>
         </p:spPr>
       </p:pic>
+      <p:sp>
+        <p:nvSpPr>
+          <p:cNvPr id="5" name="文本框 12">
+            <a:extLst>
+              <a:ext uri="{FF2B5EF4-FFF2-40B4-BE49-F238E27FC236}">
+                <a16:creationId xmlns:a16="http://schemas.microsoft.com/office/drawing/2014/main" id="{654E4184-1358-33FA-E76F-83CED5FD218B}"/>
+              </a:ext>
+            </a:extLst>
+          </p:cNvPr>
+          <p:cNvSpPr txBox="1"/>
+          <p:nvPr/>
+        </p:nvSpPr>
+        <p:spPr>
+          <a:xfrm>
+            <a:off x="612371" y="6082898"/>
+            <a:ext cx="4370176" cy="415114"/>
+          </a:xfrm>
+          <a:prstGeom prst="rect">
+            <a:avLst/>
+          </a:prstGeom>
+          <a:noFill/>
+        </p:spPr>
+        <p:txBody>
+          <a:bodyPr wrap="square" lIns="0" tIns="0" rIns="0" bIns="0" rtlCol="0">
+            <a:spAutoFit/>
+          </a:bodyPr>
+          <a:lstStyle/>
+          <a:p>
+            <a:pPr>
+              <a:lnSpc>
+                <a:spcPct val="114000"/>
+              </a:lnSpc>
+            </a:pPr>
+            <a:r>
+              <a:rPr lang="en-US" altLang="zh-CN" sz="900" dirty="0" err="1">
+                <a:solidFill>
+                  <a:schemeClr val="accent6">
+                    <a:lumMod val="50000"/>
+                  </a:schemeClr>
+                </a:solidFill>
+                <a:latin typeface="+mn-lt"/>
+              </a:rPr>
+              <a:t>Tordeux</a:t>
+            </a:r>
+            <a:r>
+              <a:rPr lang="en-US" altLang="zh-CN" sz="900" dirty="0">
+                <a:solidFill>
+                  <a:schemeClr val="accent6">
+                    <a:lumMod val="50000"/>
+                  </a:schemeClr>
+                </a:solidFill>
+                <a:latin typeface="+mn-lt"/>
+              </a:rPr>
+              <a:t> A. et al. Prediction of pedestrian speed with artificial neural networks, 2018.</a:t>
+            </a:r>
+            <a:endParaRPr lang="en-US" altLang="zh-CN" sz="800" dirty="0">
+              <a:solidFill>
+                <a:schemeClr val="accent6">
+                  <a:lumMod val="50000"/>
+                </a:schemeClr>
+              </a:solidFill>
+              <a:effectLst/>
+              <a:latin typeface="+mn-lt"/>
+            </a:endParaRPr>
+          </a:p>
+          <a:p>
+            <a:pPr>
+              <a:lnSpc>
+                <a:spcPct val="114000"/>
+              </a:lnSpc>
+            </a:pPr>
+            <a:endParaRPr kumimoji="1" lang="zh-CN" altLang="en-US" sz="1600" dirty="0" err="1">
+              <a:latin typeface="+mn-lt"/>
+            </a:endParaRPr>
+          </a:p>
+        </p:txBody>
+      </p:sp>
     </p:spTree>
     <p:extLst>
       <p:ext uri="{BB962C8B-B14F-4D97-AF65-F5344CB8AC3E}">
@@ -10812,29 +10863,6 @@
               <a:t>3</a:t>
             </a:fld>
             <a:endParaRPr lang="de-DE" dirty="0"/>
-          </a:p>
-        </p:txBody>
-      </p:sp>
-      <p:sp>
-        <p:nvSpPr>
-          <p:cNvPr id="7" name="Fußzeilenplatzhalter 4"/>
-          <p:cNvSpPr>
-            <a:spLocks noGrp="1"/>
-          </p:cNvSpPr>
-          <p:nvPr>
-            <p:ph type="ftr" sz="quarter" idx="12"/>
-          </p:nvPr>
-        </p:nvSpPr>
-        <p:spPr/>
-        <p:txBody>
-          <a:bodyPr/>
-          <a:lstStyle/>
-          <a:p>
-            <a:r>
-              <a:rPr lang="de-DE"/>
-              <a:t>Dr. rer. nat. Erika Mustermann (TUM) | kann beliebig erweitert werden | Infos mit Strich trennen</a:t>
-            </a:r>
-            <a:endParaRPr lang="en-US" dirty="0"/>
           </a:p>
         </p:txBody>
       </p:sp>
@@ -10949,6 +10977,219 @@
           </a:prstGeom>
         </p:spPr>
       </p:pic>
+      <p:sp>
+        <p:nvSpPr>
+          <p:cNvPr id="5" name="文本框 12">
+            <a:extLst>
+              <a:ext uri="{FF2B5EF4-FFF2-40B4-BE49-F238E27FC236}">
+                <a16:creationId xmlns:a16="http://schemas.microsoft.com/office/drawing/2014/main" id="{79A1A89B-C415-9129-C392-AF331298B53E}"/>
+              </a:ext>
+            </a:extLst>
+          </p:cNvPr>
+          <p:cNvSpPr txBox="1"/>
+          <p:nvPr/>
+        </p:nvSpPr>
+        <p:spPr>
+          <a:xfrm>
+            <a:off x="4941239" y="6159241"/>
+            <a:ext cx="3883670" cy="302519"/>
+          </a:xfrm>
+          <a:prstGeom prst="rect">
+            <a:avLst/>
+          </a:prstGeom>
+          <a:noFill/>
+        </p:spPr>
+        <p:txBody>
+          <a:bodyPr wrap="square" lIns="0" tIns="0" rIns="0" bIns="0" rtlCol="0">
+            <a:spAutoFit/>
+          </a:bodyPr>
+          <a:lstStyle/>
+          <a:p>
+            <a:pPr>
+              <a:lnSpc>
+                <a:spcPct val="114000"/>
+              </a:lnSpc>
+            </a:pPr>
+            <a:r>
+              <a:rPr lang="en-US" altLang="zh-CN" sz="900" dirty="0" err="1">
+                <a:solidFill>
+                  <a:schemeClr val="accent6">
+                    <a:lumMod val="50000"/>
+                  </a:schemeClr>
+                </a:solidFill>
+                <a:effectLst/>
+                <a:latin typeface="+mn-lt"/>
+              </a:rPr>
+              <a:t>Keip</a:t>
+            </a:r>
+            <a:r>
+              <a:rPr lang="en-US" altLang="zh-CN" sz="900" dirty="0">
+                <a:solidFill>
+                  <a:schemeClr val="accent6">
+                    <a:lumMod val="50000"/>
+                  </a:schemeClr>
+                </a:solidFill>
+                <a:effectLst/>
+                <a:latin typeface="+mn-lt"/>
+              </a:rPr>
+              <a:t> C, Ries K. </a:t>
+            </a:r>
+            <a:r>
+              <a:rPr lang="en-US" altLang="zh-CN" sz="900" dirty="0" err="1">
+                <a:solidFill>
+                  <a:schemeClr val="accent6">
+                    <a:lumMod val="50000"/>
+                  </a:schemeClr>
+                </a:solidFill>
+                <a:effectLst/>
+                <a:latin typeface="+mn-lt"/>
+              </a:rPr>
+              <a:t>Dokumentation</a:t>
+            </a:r>
+            <a:r>
+              <a:rPr lang="en-US" altLang="zh-CN" sz="900" dirty="0">
+                <a:solidFill>
+                  <a:schemeClr val="accent6">
+                    <a:lumMod val="50000"/>
+                  </a:schemeClr>
+                </a:solidFill>
+                <a:effectLst/>
+                <a:latin typeface="+mn-lt"/>
+              </a:rPr>
+              <a:t> von </a:t>
+            </a:r>
+            <a:r>
+              <a:rPr lang="en-US" altLang="zh-CN" sz="900" dirty="0" err="1">
+                <a:solidFill>
+                  <a:schemeClr val="accent6">
+                    <a:lumMod val="50000"/>
+                  </a:schemeClr>
+                </a:solidFill>
+                <a:effectLst/>
+                <a:latin typeface="+mn-lt"/>
+              </a:rPr>
+              <a:t>Versuchen</a:t>
+            </a:r>
+            <a:r>
+              <a:rPr lang="en-US" altLang="zh-CN" sz="900" dirty="0">
+                <a:solidFill>
+                  <a:schemeClr val="accent6">
+                    <a:lumMod val="50000"/>
+                  </a:schemeClr>
+                </a:solidFill>
+                <a:effectLst/>
+                <a:latin typeface="+mn-lt"/>
+              </a:rPr>
+              <a:t> </a:t>
+            </a:r>
+            <a:r>
+              <a:rPr lang="en-US" altLang="zh-CN" sz="900" dirty="0" err="1">
+                <a:solidFill>
+                  <a:schemeClr val="accent6">
+                    <a:lumMod val="50000"/>
+                  </a:schemeClr>
+                </a:solidFill>
+                <a:effectLst/>
+                <a:latin typeface="+mn-lt"/>
+              </a:rPr>
+              <a:t>zur</a:t>
+            </a:r>
+            <a:r>
+              <a:rPr lang="en-US" altLang="zh-CN" sz="900" dirty="0">
+                <a:solidFill>
+                  <a:schemeClr val="accent6">
+                    <a:lumMod val="50000"/>
+                  </a:schemeClr>
+                </a:solidFill>
+                <a:effectLst/>
+                <a:latin typeface="+mn-lt"/>
+              </a:rPr>
+              <a:t> </a:t>
+            </a:r>
+            <a:r>
+              <a:rPr lang="en-US" altLang="zh-CN" sz="900" dirty="0" err="1">
+                <a:solidFill>
+                  <a:schemeClr val="accent6">
+                    <a:lumMod val="50000"/>
+                  </a:schemeClr>
+                </a:solidFill>
+                <a:effectLst/>
+                <a:latin typeface="+mn-lt"/>
+              </a:rPr>
+              <a:t>Personenstromdynamik</a:t>
+            </a:r>
+            <a:r>
+              <a:rPr lang="en-US" altLang="zh-CN" sz="900" dirty="0">
+                <a:solidFill>
+                  <a:schemeClr val="accent6">
+                    <a:lumMod val="50000"/>
+                  </a:schemeClr>
+                </a:solidFill>
+                <a:effectLst/>
+                <a:latin typeface="+mn-lt"/>
+              </a:rPr>
+              <a:t> “[J]. Project Hermes, </a:t>
+            </a:r>
+            <a:r>
+              <a:rPr lang="en-US" altLang="zh-CN" sz="900" dirty="0" err="1">
+                <a:solidFill>
+                  <a:schemeClr val="accent6">
+                    <a:lumMod val="50000"/>
+                  </a:schemeClr>
+                </a:solidFill>
+                <a:effectLst/>
+                <a:latin typeface="+mn-lt"/>
+              </a:rPr>
+              <a:t>Bergische</a:t>
+            </a:r>
+            <a:r>
+              <a:rPr lang="en-US" altLang="zh-CN" sz="900" dirty="0">
+                <a:solidFill>
+                  <a:schemeClr val="accent6">
+                    <a:lumMod val="50000"/>
+                  </a:schemeClr>
+                </a:solidFill>
+                <a:effectLst/>
+                <a:latin typeface="+mn-lt"/>
+              </a:rPr>
+              <a:t> </a:t>
+            </a:r>
+            <a:r>
+              <a:rPr lang="en-US" altLang="zh-CN" sz="900" dirty="0" err="1">
+                <a:solidFill>
+                  <a:schemeClr val="accent6">
+                    <a:lumMod val="50000"/>
+                  </a:schemeClr>
+                </a:solidFill>
+                <a:effectLst/>
+                <a:latin typeface="+mn-lt"/>
+              </a:rPr>
+              <a:t>Universit</a:t>
+            </a:r>
+            <a:r>
+              <a:rPr lang="en-US" altLang="zh-CN" sz="900" dirty="0">
+                <a:solidFill>
+                  <a:schemeClr val="accent6">
+                    <a:lumMod val="50000"/>
+                  </a:schemeClr>
+                </a:solidFill>
+                <a:effectLst/>
+                <a:latin typeface="+mn-lt"/>
+              </a:rPr>
+              <a:t> ̈at Wuppertal, Tech. Rep, 2009. </a:t>
+            </a:r>
+            <a:endParaRPr lang="en-US" altLang="zh-CN" sz="800" dirty="0">
+              <a:solidFill>
+                <a:schemeClr val="accent6">
+                  <a:lumMod val="50000"/>
+                </a:schemeClr>
+              </a:solidFill>
+              <a:effectLst/>
+              <a:latin typeface="+mn-lt"/>
+            </a:endParaRPr>
+          </a:p>
+        </p:txBody>
+      </p:sp>
     </p:spTree>
     <p:extLst>
       <p:ext uri="{BB962C8B-B14F-4D97-AF65-F5344CB8AC3E}">
@@ -11027,29 +11268,6 @@
       </p:sp>
       <p:sp>
         <p:nvSpPr>
-          <p:cNvPr id="7" name="Fußzeilenplatzhalter 4"/>
-          <p:cNvSpPr>
-            <a:spLocks noGrp="1"/>
-          </p:cNvSpPr>
-          <p:nvPr>
-            <p:ph type="ftr" sz="quarter" idx="12"/>
-          </p:nvPr>
-        </p:nvSpPr>
-        <p:spPr/>
-        <p:txBody>
-          <a:bodyPr/>
-          <a:lstStyle/>
-          <a:p>
-            <a:r>
-              <a:rPr lang="de-DE"/>
-              <a:t>Dr. rer. nat. Erika Mustermann (TUM) | kann beliebig erweitert werden | Infos mit Strich trennen</a:t>
-            </a:r>
-            <a:endParaRPr lang="en-US" dirty="0"/>
-          </a:p>
-        </p:txBody>
-      </p:sp>
-      <p:sp>
-        <p:nvSpPr>
           <p:cNvPr id="3" name="Titel 2"/>
           <p:cNvSpPr>
             <a:spLocks noGrp="1"/>
@@ -11129,6 +11347,83 @@
           </a:prstGeom>
         </p:spPr>
       </p:pic>
+      <p:sp>
+        <p:nvSpPr>
+          <p:cNvPr id="5" name="文本框 12">
+            <a:extLst>
+              <a:ext uri="{FF2B5EF4-FFF2-40B4-BE49-F238E27FC236}">
+                <a16:creationId xmlns:a16="http://schemas.microsoft.com/office/drawing/2014/main" id="{7982FF95-F43A-2345-8634-17A2C82B87E3}"/>
+              </a:ext>
+            </a:extLst>
+          </p:cNvPr>
+          <p:cNvSpPr txBox="1"/>
+          <p:nvPr/>
+        </p:nvSpPr>
+        <p:spPr>
+          <a:xfrm>
+            <a:off x="631032" y="6353421"/>
+            <a:ext cx="4370176" cy="415114"/>
+          </a:xfrm>
+          <a:prstGeom prst="rect">
+            <a:avLst/>
+          </a:prstGeom>
+          <a:noFill/>
+        </p:spPr>
+        <p:txBody>
+          <a:bodyPr wrap="square" lIns="0" tIns="0" rIns="0" bIns="0" rtlCol="0">
+            <a:spAutoFit/>
+          </a:bodyPr>
+          <a:lstStyle/>
+          <a:p>
+            <a:pPr>
+              <a:lnSpc>
+                <a:spcPct val="114000"/>
+              </a:lnSpc>
+            </a:pPr>
+            <a:r>
+              <a:rPr lang="en-US" altLang="zh-CN" sz="900" dirty="0" err="1">
+                <a:solidFill>
+                  <a:schemeClr val="accent6">
+                    <a:lumMod val="50000"/>
+                  </a:schemeClr>
+                </a:solidFill>
+                <a:latin typeface="+mn-lt"/>
+              </a:rPr>
+              <a:t>Tordeux</a:t>
+            </a:r>
+            <a:r>
+              <a:rPr lang="en-US" altLang="zh-CN" sz="900" dirty="0">
+                <a:solidFill>
+                  <a:schemeClr val="accent6">
+                    <a:lumMod val="50000"/>
+                  </a:schemeClr>
+                </a:solidFill>
+                <a:latin typeface="+mn-lt"/>
+              </a:rPr>
+              <a:t> A. et al. Prediction of pedestrian speed with artificial neural networks, 2018.</a:t>
+            </a:r>
+            <a:endParaRPr lang="en-US" altLang="zh-CN" sz="800" dirty="0">
+              <a:solidFill>
+                <a:schemeClr val="accent6">
+                  <a:lumMod val="50000"/>
+                </a:schemeClr>
+              </a:solidFill>
+              <a:effectLst/>
+              <a:latin typeface="+mn-lt"/>
+            </a:endParaRPr>
+          </a:p>
+          <a:p>
+            <a:pPr>
+              <a:lnSpc>
+                <a:spcPct val="114000"/>
+              </a:lnSpc>
+            </a:pPr>
+            <a:endParaRPr kumimoji="1" lang="zh-CN" altLang="en-US" sz="1600" dirty="0" err="1">
+              <a:latin typeface="+mn-lt"/>
+            </a:endParaRPr>
+          </a:p>
+        </p:txBody>
+      </p:sp>
     </p:spTree>
     <p:extLst>
       <p:ext uri="{BB962C8B-B14F-4D97-AF65-F5344CB8AC3E}">
@@ -11244,7 +11539,13 @@
                             <a:rPr lang="de-DE" b="0" i="1" smtClean="0">
                               <a:latin typeface="Cambria Math" panose="02040503050406030204" pitchFamily="18" charset="0"/>
                             </a:rPr>
-                            <m:t>1−</m:t>
+                            <m:t>1</m:t>
+                          </m:r>
+                          <m:r>
+                            <a:rPr lang="de-DE" b="0" i="1" smtClean="0">
+                              <a:latin typeface="Cambria Math" panose="02040503050406030204" pitchFamily="18" charset="0"/>
+                            </a:rPr>
+                            <m:t>−</m:t>
                           </m:r>
                           <m:func>
                             <m:funcPr>
@@ -11751,29 +12052,6 @@
       </p:sp>
       <p:sp>
         <p:nvSpPr>
-          <p:cNvPr id="7" name="Fußzeilenplatzhalter 4"/>
-          <p:cNvSpPr>
-            <a:spLocks noGrp="1"/>
-          </p:cNvSpPr>
-          <p:nvPr>
-            <p:ph type="ftr" sz="quarter" idx="12"/>
-          </p:nvPr>
-        </p:nvSpPr>
-        <p:spPr/>
-        <p:txBody>
-          <a:bodyPr/>
-          <a:lstStyle/>
-          <a:p>
-            <a:r>
-              <a:rPr lang="de-DE"/>
-              <a:t>Dr. rer. nat. Erika Mustermann (TUM) | kann beliebig erweitert werden | Infos mit Strich trennen</a:t>
-            </a:r>
-            <a:endParaRPr lang="en-US" dirty="0"/>
-          </a:p>
-        </p:txBody>
-      </p:sp>
-      <p:sp>
-        <p:nvSpPr>
           <p:cNvPr id="3" name="Titel 2"/>
           <p:cNvSpPr>
             <a:spLocks noGrp="1"/>
@@ -11901,29 +12179,6 @@
       </p:sp>
       <p:sp>
         <p:nvSpPr>
-          <p:cNvPr id="7" name="Fußzeilenplatzhalter 4"/>
-          <p:cNvSpPr>
-            <a:spLocks noGrp="1"/>
-          </p:cNvSpPr>
-          <p:nvPr>
-            <p:ph type="ftr" sz="quarter" idx="12"/>
-          </p:nvPr>
-        </p:nvSpPr>
-        <p:spPr/>
-        <p:txBody>
-          <a:bodyPr/>
-          <a:lstStyle/>
-          <a:p>
-            <a:r>
-              <a:rPr lang="de-DE"/>
-              <a:t>Dr. rer. nat. Erika Mustermann (TUM) | kann beliebig erweitert werden | Infos mit Strich trennen</a:t>
-            </a:r>
-            <a:endParaRPr lang="en-US" dirty="0"/>
-          </a:p>
-        </p:txBody>
-      </p:sp>
-      <p:sp>
-        <p:nvSpPr>
           <p:cNvPr id="3" name="Titel 2"/>
           <p:cNvSpPr>
             <a:spLocks noGrp="1"/>
@@ -12011,6 +12266,83 @@
           </a:prstGeom>
         </p:spPr>
       </p:pic>
+      <p:sp>
+        <p:nvSpPr>
+          <p:cNvPr id="5" name="文本框 12">
+            <a:extLst>
+              <a:ext uri="{FF2B5EF4-FFF2-40B4-BE49-F238E27FC236}">
+                <a16:creationId xmlns:a16="http://schemas.microsoft.com/office/drawing/2014/main" id="{9F8CE659-2F7F-D938-A66A-2484737D6A9F}"/>
+              </a:ext>
+            </a:extLst>
+          </p:cNvPr>
+          <p:cNvSpPr txBox="1"/>
+          <p:nvPr/>
+        </p:nvSpPr>
+        <p:spPr>
+          <a:xfrm>
+            <a:off x="631032" y="6353421"/>
+            <a:ext cx="4370176" cy="415114"/>
+          </a:xfrm>
+          <a:prstGeom prst="rect">
+            <a:avLst/>
+          </a:prstGeom>
+          <a:noFill/>
+        </p:spPr>
+        <p:txBody>
+          <a:bodyPr wrap="square" lIns="0" tIns="0" rIns="0" bIns="0" rtlCol="0">
+            <a:spAutoFit/>
+          </a:bodyPr>
+          <a:lstStyle/>
+          <a:p>
+            <a:pPr>
+              <a:lnSpc>
+                <a:spcPct val="114000"/>
+              </a:lnSpc>
+            </a:pPr>
+            <a:r>
+              <a:rPr lang="en-US" altLang="zh-CN" sz="900" dirty="0" err="1">
+                <a:solidFill>
+                  <a:schemeClr val="accent6">
+                    <a:lumMod val="50000"/>
+                  </a:schemeClr>
+                </a:solidFill>
+                <a:latin typeface="+mn-lt"/>
+              </a:rPr>
+              <a:t>Tordeux</a:t>
+            </a:r>
+            <a:r>
+              <a:rPr lang="en-US" altLang="zh-CN" sz="900" dirty="0">
+                <a:solidFill>
+                  <a:schemeClr val="accent6">
+                    <a:lumMod val="50000"/>
+                  </a:schemeClr>
+                </a:solidFill>
+                <a:latin typeface="+mn-lt"/>
+              </a:rPr>
+              <a:t> A. et al. Prediction of pedestrian speed with artificial neural networks, 2018.</a:t>
+            </a:r>
+            <a:endParaRPr lang="en-US" altLang="zh-CN" sz="800" dirty="0">
+              <a:solidFill>
+                <a:schemeClr val="accent6">
+                  <a:lumMod val="50000"/>
+                </a:schemeClr>
+              </a:solidFill>
+              <a:effectLst/>
+              <a:latin typeface="+mn-lt"/>
+            </a:endParaRPr>
+          </a:p>
+          <a:p>
+            <a:pPr>
+              <a:lnSpc>
+                <a:spcPct val="114000"/>
+              </a:lnSpc>
+            </a:pPr>
+            <a:endParaRPr kumimoji="1" lang="zh-CN" altLang="en-US" sz="1600" dirty="0" err="1">
+              <a:latin typeface="+mn-lt"/>
+            </a:endParaRPr>
+          </a:p>
+        </p:txBody>
+      </p:sp>
     </p:spTree>
     <p:extLst>
       <p:ext uri="{BB962C8B-B14F-4D97-AF65-F5344CB8AC3E}">
@@ -12089,29 +12421,6 @@
       </p:sp>
       <p:sp>
         <p:nvSpPr>
-          <p:cNvPr id="7" name="Fußzeilenplatzhalter 4"/>
-          <p:cNvSpPr>
-            <a:spLocks noGrp="1"/>
-          </p:cNvSpPr>
-          <p:nvPr>
-            <p:ph type="ftr" sz="quarter" idx="12"/>
-          </p:nvPr>
-        </p:nvSpPr>
-        <p:spPr/>
-        <p:txBody>
-          <a:bodyPr/>
-          <a:lstStyle/>
-          <a:p>
-            <a:r>
-              <a:rPr lang="de-DE"/>
-              <a:t>Dr. rer. nat. Erika Mustermann (TUM) | kann beliebig erweitert werden | Infos mit Strich trennen</a:t>
-            </a:r>
-            <a:endParaRPr lang="en-US" dirty="0"/>
-          </a:p>
-        </p:txBody>
-      </p:sp>
-      <p:sp>
-        <p:nvSpPr>
           <p:cNvPr id="3" name="Titel 2"/>
           <p:cNvSpPr>
             <a:spLocks noGrp="1"/>
@@ -12199,6 +12508,83 @@
           </a:prstGeom>
         </p:spPr>
       </p:pic>
+      <p:sp>
+        <p:nvSpPr>
+          <p:cNvPr id="5" name="文本框 12">
+            <a:extLst>
+              <a:ext uri="{FF2B5EF4-FFF2-40B4-BE49-F238E27FC236}">
+                <a16:creationId xmlns:a16="http://schemas.microsoft.com/office/drawing/2014/main" id="{1C1702D5-C729-301F-F3B3-14A5D54F42E9}"/>
+              </a:ext>
+            </a:extLst>
+          </p:cNvPr>
+          <p:cNvSpPr txBox="1"/>
+          <p:nvPr/>
+        </p:nvSpPr>
+        <p:spPr>
+          <a:xfrm>
+            <a:off x="631032" y="6353421"/>
+            <a:ext cx="4370176" cy="415114"/>
+          </a:xfrm>
+          <a:prstGeom prst="rect">
+            <a:avLst/>
+          </a:prstGeom>
+          <a:noFill/>
+        </p:spPr>
+        <p:txBody>
+          <a:bodyPr wrap="square" lIns="0" tIns="0" rIns="0" bIns="0" rtlCol="0">
+            <a:spAutoFit/>
+          </a:bodyPr>
+          <a:lstStyle/>
+          <a:p>
+            <a:pPr>
+              <a:lnSpc>
+                <a:spcPct val="114000"/>
+              </a:lnSpc>
+            </a:pPr>
+            <a:r>
+              <a:rPr lang="en-US" altLang="zh-CN" sz="900" dirty="0" err="1">
+                <a:solidFill>
+                  <a:schemeClr val="accent6">
+                    <a:lumMod val="50000"/>
+                  </a:schemeClr>
+                </a:solidFill>
+                <a:latin typeface="+mn-lt"/>
+              </a:rPr>
+              <a:t>Tordeux</a:t>
+            </a:r>
+            <a:r>
+              <a:rPr lang="en-US" altLang="zh-CN" sz="900" dirty="0">
+                <a:solidFill>
+                  <a:schemeClr val="accent6">
+                    <a:lumMod val="50000"/>
+                  </a:schemeClr>
+                </a:solidFill>
+                <a:latin typeface="+mn-lt"/>
+              </a:rPr>
+              <a:t> A. et al. Prediction of pedestrian speed with artificial neural networks, 2018.</a:t>
+            </a:r>
+            <a:endParaRPr lang="en-US" altLang="zh-CN" sz="800" dirty="0">
+              <a:solidFill>
+                <a:schemeClr val="accent6">
+                  <a:lumMod val="50000"/>
+                </a:schemeClr>
+              </a:solidFill>
+              <a:effectLst/>
+              <a:latin typeface="+mn-lt"/>
+            </a:endParaRPr>
+          </a:p>
+          <a:p>
+            <a:pPr>
+              <a:lnSpc>
+                <a:spcPct val="114000"/>
+              </a:lnSpc>
+            </a:pPr>
+            <a:endParaRPr kumimoji="1" lang="zh-CN" altLang="en-US" sz="1600" dirty="0" err="1">
+              <a:latin typeface="+mn-lt"/>
+            </a:endParaRPr>
+          </a:p>
+        </p:txBody>
+      </p:sp>
     </p:spTree>
     <p:extLst>
       <p:ext uri="{BB962C8B-B14F-4D97-AF65-F5344CB8AC3E}">
@@ -12277,29 +12663,6 @@
       </p:sp>
       <p:sp>
         <p:nvSpPr>
-          <p:cNvPr id="7" name="Fußzeilenplatzhalter 4"/>
-          <p:cNvSpPr>
-            <a:spLocks noGrp="1"/>
-          </p:cNvSpPr>
-          <p:nvPr>
-            <p:ph type="ftr" sz="quarter" idx="12"/>
-          </p:nvPr>
-        </p:nvSpPr>
-        <p:spPr/>
-        <p:txBody>
-          <a:bodyPr/>
-          <a:lstStyle/>
-          <a:p>
-            <a:r>
-              <a:rPr lang="de-DE"/>
-              <a:t>Dr. rer. nat. Erika Mustermann (TUM) | kann beliebig erweitert werden | Infos mit Strich trennen</a:t>
-            </a:r>
-            <a:endParaRPr lang="en-US" dirty="0"/>
-          </a:p>
-        </p:txBody>
-      </p:sp>
-      <p:sp>
-        <p:nvSpPr>
           <p:cNvPr id="3" name="Titel 2"/>
           <p:cNvSpPr>
             <a:spLocks noGrp="1"/>
@@ -12387,6 +12750,83 @@
           </a:prstGeom>
         </p:spPr>
       </p:pic>
+      <p:sp>
+        <p:nvSpPr>
+          <p:cNvPr id="5" name="文本框 12">
+            <a:extLst>
+              <a:ext uri="{FF2B5EF4-FFF2-40B4-BE49-F238E27FC236}">
+                <a16:creationId xmlns:a16="http://schemas.microsoft.com/office/drawing/2014/main" id="{B94BDE42-7CDF-0340-4F09-8558E5EB7883}"/>
+              </a:ext>
+            </a:extLst>
+          </p:cNvPr>
+          <p:cNvSpPr txBox="1"/>
+          <p:nvPr/>
+        </p:nvSpPr>
+        <p:spPr>
+          <a:xfrm>
+            <a:off x="631032" y="6353421"/>
+            <a:ext cx="4370176" cy="415114"/>
+          </a:xfrm>
+          <a:prstGeom prst="rect">
+            <a:avLst/>
+          </a:prstGeom>
+          <a:noFill/>
+        </p:spPr>
+        <p:txBody>
+          <a:bodyPr wrap="square" lIns="0" tIns="0" rIns="0" bIns="0" rtlCol="0">
+            <a:spAutoFit/>
+          </a:bodyPr>
+          <a:lstStyle/>
+          <a:p>
+            <a:pPr>
+              <a:lnSpc>
+                <a:spcPct val="114000"/>
+              </a:lnSpc>
+            </a:pPr>
+            <a:r>
+              <a:rPr lang="en-US" altLang="zh-CN" sz="900" dirty="0" err="1">
+                <a:solidFill>
+                  <a:schemeClr val="accent6">
+                    <a:lumMod val="50000"/>
+                  </a:schemeClr>
+                </a:solidFill>
+                <a:latin typeface="+mn-lt"/>
+              </a:rPr>
+              <a:t>Tordeux</a:t>
+            </a:r>
+            <a:r>
+              <a:rPr lang="en-US" altLang="zh-CN" sz="900" dirty="0">
+                <a:solidFill>
+                  <a:schemeClr val="accent6">
+                    <a:lumMod val="50000"/>
+                  </a:schemeClr>
+                </a:solidFill>
+                <a:latin typeface="+mn-lt"/>
+              </a:rPr>
+              <a:t> A. et al. Prediction of pedestrian speed with artificial neural networks, 2018.</a:t>
+            </a:r>
+            <a:endParaRPr lang="en-US" altLang="zh-CN" sz="800" dirty="0">
+              <a:solidFill>
+                <a:schemeClr val="accent6">
+                  <a:lumMod val="50000"/>
+                </a:schemeClr>
+              </a:solidFill>
+              <a:effectLst/>
+              <a:latin typeface="+mn-lt"/>
+            </a:endParaRPr>
+          </a:p>
+          <a:p>
+            <a:pPr>
+              <a:lnSpc>
+                <a:spcPct val="114000"/>
+              </a:lnSpc>
+            </a:pPr>
+            <a:endParaRPr kumimoji="1" lang="zh-CN" altLang="en-US" sz="1600" dirty="0" err="1">
+              <a:latin typeface="+mn-lt"/>
+            </a:endParaRPr>
+          </a:p>
+        </p:txBody>
+      </p:sp>
     </p:spTree>
     <p:extLst>
       <p:ext uri="{BB962C8B-B14F-4D97-AF65-F5344CB8AC3E}">

</xml_diff>